<commit_message>
Dr. Yi Wang @ Fudan
</commit_message>
<xml_diff>
--- a/images/image.pptx
+++ b/images/image.pptx
@@ -259,7 +259,7 @@
           <a:p>
             <a:fld id="{CF8E0A0A-91B5-465A-BD1D-8CFA8734FEE6}" type="datetimeFigureOut">
               <a:rPr lang="en-US" smtClean="0"/>
-              <a:t>1/24/2023</a:t>
+              <a:t>1/25/2023</a:t>
             </a:fld>
             <a:endParaRPr lang="en-US"/>
           </a:p>
@@ -457,7 +457,7 @@
           <a:p>
             <a:fld id="{CF8E0A0A-91B5-465A-BD1D-8CFA8734FEE6}" type="datetimeFigureOut">
               <a:rPr lang="en-US" smtClean="0"/>
-              <a:t>1/24/2023</a:t>
+              <a:t>1/25/2023</a:t>
             </a:fld>
             <a:endParaRPr lang="en-US"/>
           </a:p>
@@ -665,7 +665,7 @@
           <a:p>
             <a:fld id="{CF8E0A0A-91B5-465A-BD1D-8CFA8734FEE6}" type="datetimeFigureOut">
               <a:rPr lang="en-US" smtClean="0"/>
-              <a:t>1/24/2023</a:t>
+              <a:t>1/25/2023</a:t>
             </a:fld>
             <a:endParaRPr lang="en-US"/>
           </a:p>
@@ -863,7 +863,7 @@
           <a:p>
             <a:fld id="{CF8E0A0A-91B5-465A-BD1D-8CFA8734FEE6}" type="datetimeFigureOut">
               <a:rPr lang="en-US" smtClean="0"/>
-              <a:t>1/24/2023</a:t>
+              <a:t>1/25/2023</a:t>
             </a:fld>
             <a:endParaRPr lang="en-US"/>
           </a:p>
@@ -1138,7 +1138,7 @@
           <a:p>
             <a:fld id="{CF8E0A0A-91B5-465A-BD1D-8CFA8734FEE6}" type="datetimeFigureOut">
               <a:rPr lang="en-US" smtClean="0"/>
-              <a:t>1/24/2023</a:t>
+              <a:t>1/25/2023</a:t>
             </a:fld>
             <a:endParaRPr lang="en-US"/>
           </a:p>
@@ -1403,7 +1403,7 @@
           <a:p>
             <a:fld id="{CF8E0A0A-91B5-465A-BD1D-8CFA8734FEE6}" type="datetimeFigureOut">
               <a:rPr lang="en-US" smtClean="0"/>
-              <a:t>1/24/2023</a:t>
+              <a:t>1/25/2023</a:t>
             </a:fld>
             <a:endParaRPr lang="en-US"/>
           </a:p>
@@ -1815,7 +1815,7 @@
           <a:p>
             <a:fld id="{CF8E0A0A-91B5-465A-BD1D-8CFA8734FEE6}" type="datetimeFigureOut">
               <a:rPr lang="en-US" smtClean="0"/>
-              <a:t>1/24/2023</a:t>
+              <a:t>1/25/2023</a:t>
             </a:fld>
             <a:endParaRPr lang="en-US"/>
           </a:p>
@@ -1956,7 +1956,7 @@
           <a:p>
             <a:fld id="{CF8E0A0A-91B5-465A-BD1D-8CFA8734FEE6}" type="datetimeFigureOut">
               <a:rPr lang="en-US" smtClean="0"/>
-              <a:t>1/24/2023</a:t>
+              <a:t>1/25/2023</a:t>
             </a:fld>
             <a:endParaRPr lang="en-US"/>
           </a:p>
@@ -2069,7 +2069,7 @@
           <a:p>
             <a:fld id="{CF8E0A0A-91B5-465A-BD1D-8CFA8734FEE6}" type="datetimeFigureOut">
               <a:rPr lang="en-US" smtClean="0"/>
-              <a:t>1/24/2023</a:t>
+              <a:t>1/25/2023</a:t>
             </a:fld>
             <a:endParaRPr lang="en-US"/>
           </a:p>
@@ -2380,7 +2380,7 @@
           <a:p>
             <a:fld id="{CF8E0A0A-91B5-465A-BD1D-8CFA8734FEE6}" type="datetimeFigureOut">
               <a:rPr lang="en-US" smtClean="0"/>
-              <a:t>1/24/2023</a:t>
+              <a:t>1/25/2023</a:t>
             </a:fld>
             <a:endParaRPr lang="en-US"/>
           </a:p>
@@ -2668,7 +2668,7 @@
           <a:p>
             <a:fld id="{CF8E0A0A-91B5-465A-BD1D-8CFA8734FEE6}" type="datetimeFigureOut">
               <a:rPr lang="en-US" smtClean="0"/>
-              <a:t>1/24/2023</a:t>
+              <a:t>1/25/2023</a:t>
             </a:fld>
             <a:endParaRPr lang="en-US"/>
           </a:p>
@@ -2909,7 +2909,7 @@
           <a:p>
             <a:fld id="{CF8E0A0A-91B5-465A-BD1D-8CFA8734FEE6}" type="datetimeFigureOut">
               <a:rPr lang="en-US" smtClean="0"/>
-              <a:t>1/24/2023</a:t>
+              <a:t>1/25/2023</a:t>
             </a:fld>
             <a:endParaRPr lang="en-US"/>
           </a:p>
@@ -3479,7 +3479,7 @@
         <p:spPr>
           <a:xfrm>
             <a:off x="1865744" y="2179950"/>
-            <a:ext cx="1459309" cy="1847850"/>
+            <a:ext cx="1391765" cy="1762322"/>
           </a:xfrm>
           <a:prstGeom prst="rect">
             <a:avLst/>

</xml_diff>

<commit_message>
Dr. Haizhou Liu @ Nanjing
</commit_message>
<xml_diff>
--- a/images/image.pptx
+++ b/images/image.pptx
@@ -259,7 +259,7 @@
           <a:p>
             <a:fld id="{CF8E0A0A-91B5-465A-BD1D-8CFA8734FEE6}" type="datetimeFigureOut">
               <a:rPr lang="en-US" smtClean="0"/>
-              <a:t>2/9/2023</a:t>
+              <a:t>3/2/2023</a:t>
             </a:fld>
             <a:endParaRPr lang="en-US"/>
           </a:p>
@@ -457,7 +457,7 @@
           <a:p>
             <a:fld id="{CF8E0A0A-91B5-465A-BD1D-8CFA8734FEE6}" type="datetimeFigureOut">
               <a:rPr lang="en-US" smtClean="0"/>
-              <a:t>2/9/2023</a:t>
+              <a:t>3/2/2023</a:t>
             </a:fld>
             <a:endParaRPr lang="en-US"/>
           </a:p>
@@ -665,7 +665,7 @@
           <a:p>
             <a:fld id="{CF8E0A0A-91B5-465A-BD1D-8CFA8734FEE6}" type="datetimeFigureOut">
               <a:rPr lang="en-US" smtClean="0"/>
-              <a:t>2/9/2023</a:t>
+              <a:t>3/2/2023</a:t>
             </a:fld>
             <a:endParaRPr lang="en-US"/>
           </a:p>
@@ -863,7 +863,7 @@
           <a:p>
             <a:fld id="{CF8E0A0A-91B5-465A-BD1D-8CFA8734FEE6}" type="datetimeFigureOut">
               <a:rPr lang="en-US" smtClean="0"/>
-              <a:t>2/9/2023</a:t>
+              <a:t>3/2/2023</a:t>
             </a:fld>
             <a:endParaRPr lang="en-US"/>
           </a:p>
@@ -1138,7 +1138,7 @@
           <a:p>
             <a:fld id="{CF8E0A0A-91B5-465A-BD1D-8CFA8734FEE6}" type="datetimeFigureOut">
               <a:rPr lang="en-US" smtClean="0"/>
-              <a:t>2/9/2023</a:t>
+              <a:t>3/2/2023</a:t>
             </a:fld>
             <a:endParaRPr lang="en-US"/>
           </a:p>
@@ -1403,7 +1403,7 @@
           <a:p>
             <a:fld id="{CF8E0A0A-91B5-465A-BD1D-8CFA8734FEE6}" type="datetimeFigureOut">
               <a:rPr lang="en-US" smtClean="0"/>
-              <a:t>2/9/2023</a:t>
+              <a:t>3/2/2023</a:t>
             </a:fld>
             <a:endParaRPr lang="en-US"/>
           </a:p>
@@ -1815,7 +1815,7 @@
           <a:p>
             <a:fld id="{CF8E0A0A-91B5-465A-BD1D-8CFA8734FEE6}" type="datetimeFigureOut">
               <a:rPr lang="en-US" smtClean="0"/>
-              <a:t>2/9/2023</a:t>
+              <a:t>3/2/2023</a:t>
             </a:fld>
             <a:endParaRPr lang="en-US"/>
           </a:p>
@@ -1956,7 +1956,7 @@
           <a:p>
             <a:fld id="{CF8E0A0A-91B5-465A-BD1D-8CFA8734FEE6}" type="datetimeFigureOut">
               <a:rPr lang="en-US" smtClean="0"/>
-              <a:t>2/9/2023</a:t>
+              <a:t>3/2/2023</a:t>
             </a:fld>
             <a:endParaRPr lang="en-US"/>
           </a:p>
@@ -2069,7 +2069,7 @@
           <a:p>
             <a:fld id="{CF8E0A0A-91B5-465A-BD1D-8CFA8734FEE6}" type="datetimeFigureOut">
               <a:rPr lang="en-US" smtClean="0"/>
-              <a:t>2/9/2023</a:t>
+              <a:t>3/2/2023</a:t>
             </a:fld>
             <a:endParaRPr lang="en-US"/>
           </a:p>
@@ -2380,7 +2380,7 @@
           <a:p>
             <a:fld id="{CF8E0A0A-91B5-465A-BD1D-8CFA8734FEE6}" type="datetimeFigureOut">
               <a:rPr lang="en-US" smtClean="0"/>
-              <a:t>2/9/2023</a:t>
+              <a:t>3/2/2023</a:t>
             </a:fld>
             <a:endParaRPr lang="en-US"/>
           </a:p>
@@ -2668,7 +2668,7 @@
           <a:p>
             <a:fld id="{CF8E0A0A-91B5-465A-BD1D-8CFA8734FEE6}" type="datetimeFigureOut">
               <a:rPr lang="en-US" smtClean="0"/>
-              <a:t>2/9/2023</a:t>
+              <a:t>3/2/2023</a:t>
             </a:fld>
             <a:endParaRPr lang="en-US"/>
           </a:p>
@@ -2909,7 +2909,7 @@
           <a:p>
             <a:fld id="{CF8E0A0A-91B5-465A-BD1D-8CFA8734FEE6}" type="datetimeFigureOut">
               <a:rPr lang="en-US" smtClean="0"/>
-              <a:t>2/9/2023</a:t>
+              <a:t>3/2/2023</a:t>
             </a:fld>
             <a:endParaRPr lang="en-US"/>
           </a:p>
@@ -3593,6 +3593,35 @@
           </a:prstGeom>
         </p:spPr>
       </p:pic>
+      <p:pic>
+        <p:nvPicPr>
+          <p:cNvPr id="2" name="图片 3">
+            <a:extLst>
+              <a:ext uri="{FF2B5EF4-FFF2-40B4-BE49-F238E27FC236}">
+                <a16:creationId xmlns:a16="http://schemas.microsoft.com/office/drawing/2014/main" id="{00000000-0008-0000-0000-000004000000}"/>
+              </a:ext>
+            </a:extLst>
+          </p:cNvPr>
+          <p:cNvPicPr>
+            <a:picLocks noChangeAspect="1"/>
+          </p:cNvPicPr>
+          <p:nvPr/>
+        </p:nvPicPr>
+        <p:blipFill rotWithShape="1">
+          <a:blip r:embed="rId10"/>
+          <a:srcRect l="25230" t="6718" r="28634" b="10768"/>
+          <a:stretch/>
+        </p:blipFill>
+        <p:spPr>
+          <a:xfrm>
+            <a:off x="1899515" y="4091876"/>
+            <a:ext cx="1391765" cy="1762323"/>
+          </a:xfrm>
+          <a:prstGeom prst="rect">
+            <a:avLst/>
+          </a:prstGeom>
+        </p:spPr>
+      </p:pic>
     </p:spTree>
     <p:extLst>
       <p:ext uri="{BB962C8B-B14F-4D97-AF65-F5344CB8AC3E}">

</xml_diff>

<commit_message>
Dr. Chengchun Shi @UK
</commit_message>
<xml_diff>
--- a/images/image.pptx
+++ b/images/image.pptx
@@ -259,7 +259,7 @@
           <a:p>
             <a:fld id="{CF8E0A0A-91B5-465A-BD1D-8CFA8734FEE6}" type="datetimeFigureOut">
               <a:rPr lang="en-US" smtClean="0"/>
-              <a:t>3/2/2023</a:t>
+              <a:t>3/4/2023</a:t>
             </a:fld>
             <a:endParaRPr lang="en-US"/>
           </a:p>
@@ -457,7 +457,7 @@
           <a:p>
             <a:fld id="{CF8E0A0A-91B5-465A-BD1D-8CFA8734FEE6}" type="datetimeFigureOut">
               <a:rPr lang="en-US" smtClean="0"/>
-              <a:t>3/2/2023</a:t>
+              <a:t>3/4/2023</a:t>
             </a:fld>
             <a:endParaRPr lang="en-US"/>
           </a:p>
@@ -665,7 +665,7 @@
           <a:p>
             <a:fld id="{CF8E0A0A-91B5-465A-BD1D-8CFA8734FEE6}" type="datetimeFigureOut">
               <a:rPr lang="en-US" smtClean="0"/>
-              <a:t>3/2/2023</a:t>
+              <a:t>3/4/2023</a:t>
             </a:fld>
             <a:endParaRPr lang="en-US"/>
           </a:p>
@@ -863,7 +863,7 @@
           <a:p>
             <a:fld id="{CF8E0A0A-91B5-465A-BD1D-8CFA8734FEE6}" type="datetimeFigureOut">
               <a:rPr lang="en-US" smtClean="0"/>
-              <a:t>3/2/2023</a:t>
+              <a:t>3/4/2023</a:t>
             </a:fld>
             <a:endParaRPr lang="en-US"/>
           </a:p>
@@ -1138,7 +1138,7 @@
           <a:p>
             <a:fld id="{CF8E0A0A-91B5-465A-BD1D-8CFA8734FEE6}" type="datetimeFigureOut">
               <a:rPr lang="en-US" smtClean="0"/>
-              <a:t>3/2/2023</a:t>
+              <a:t>3/4/2023</a:t>
             </a:fld>
             <a:endParaRPr lang="en-US"/>
           </a:p>
@@ -1403,7 +1403,7 @@
           <a:p>
             <a:fld id="{CF8E0A0A-91B5-465A-BD1D-8CFA8734FEE6}" type="datetimeFigureOut">
               <a:rPr lang="en-US" smtClean="0"/>
-              <a:t>3/2/2023</a:t>
+              <a:t>3/4/2023</a:t>
             </a:fld>
             <a:endParaRPr lang="en-US"/>
           </a:p>
@@ -1815,7 +1815,7 @@
           <a:p>
             <a:fld id="{CF8E0A0A-91B5-465A-BD1D-8CFA8734FEE6}" type="datetimeFigureOut">
               <a:rPr lang="en-US" smtClean="0"/>
-              <a:t>3/2/2023</a:t>
+              <a:t>3/4/2023</a:t>
             </a:fld>
             <a:endParaRPr lang="en-US"/>
           </a:p>
@@ -1956,7 +1956,7 @@
           <a:p>
             <a:fld id="{CF8E0A0A-91B5-465A-BD1D-8CFA8734FEE6}" type="datetimeFigureOut">
               <a:rPr lang="en-US" smtClean="0"/>
-              <a:t>3/2/2023</a:t>
+              <a:t>3/4/2023</a:t>
             </a:fld>
             <a:endParaRPr lang="en-US"/>
           </a:p>
@@ -2069,7 +2069,7 @@
           <a:p>
             <a:fld id="{CF8E0A0A-91B5-465A-BD1D-8CFA8734FEE6}" type="datetimeFigureOut">
               <a:rPr lang="en-US" smtClean="0"/>
-              <a:t>3/2/2023</a:t>
+              <a:t>3/4/2023</a:t>
             </a:fld>
             <a:endParaRPr lang="en-US"/>
           </a:p>
@@ -2380,7 +2380,7 @@
           <a:p>
             <a:fld id="{CF8E0A0A-91B5-465A-BD1D-8CFA8734FEE6}" type="datetimeFigureOut">
               <a:rPr lang="en-US" smtClean="0"/>
-              <a:t>3/2/2023</a:t>
+              <a:t>3/4/2023</a:t>
             </a:fld>
             <a:endParaRPr lang="en-US"/>
           </a:p>
@@ -2668,7 +2668,7 @@
           <a:p>
             <a:fld id="{CF8E0A0A-91B5-465A-BD1D-8CFA8734FEE6}" type="datetimeFigureOut">
               <a:rPr lang="en-US" smtClean="0"/>
-              <a:t>3/2/2023</a:t>
+              <a:t>3/4/2023</a:t>
             </a:fld>
             <a:endParaRPr lang="en-US"/>
           </a:p>
@@ -2909,7 +2909,7 @@
           <a:p>
             <a:fld id="{CF8E0A0A-91B5-465A-BD1D-8CFA8734FEE6}" type="datetimeFigureOut">
               <a:rPr lang="en-US" smtClean="0"/>
-              <a:t>3/2/2023</a:t>
+              <a:t>3/4/2023</a:t>
             </a:fld>
             <a:endParaRPr lang="en-US"/>
           </a:p>
@@ -3622,6 +3622,42 @@
           </a:prstGeom>
         </p:spPr>
       </p:pic>
+      <p:pic>
+        <p:nvPicPr>
+          <p:cNvPr id="10" name="Picture 9" descr="A person wearing glasses&#10;&#10;Description automatically generated with medium confidence">
+            <a:extLst>
+              <a:ext uri="{FF2B5EF4-FFF2-40B4-BE49-F238E27FC236}">
+                <a16:creationId xmlns:a16="http://schemas.microsoft.com/office/drawing/2014/main" id="{8C7A0F9E-7FBF-4615-1127-08B854EC9E23}"/>
+              </a:ext>
+            </a:extLst>
+          </p:cNvPr>
+          <p:cNvPicPr>
+            <a:picLocks noChangeAspect="1"/>
+          </p:cNvPicPr>
+          <p:nvPr/>
+        </p:nvPicPr>
+        <p:blipFill>
+          <a:blip r:embed="rId11">
+            <a:extLst>
+              <a:ext uri="{28A0092B-C50C-407E-A947-70E740481C1C}">
+                <a14:useLocalDpi xmlns:a14="http://schemas.microsoft.com/office/drawing/2010/main" val="0"/>
+              </a:ext>
+            </a:extLst>
+          </a:blip>
+          <a:stretch>
+            <a:fillRect/>
+          </a:stretch>
+        </p:blipFill>
+        <p:spPr>
+          <a:xfrm>
+            <a:off x="3424108" y="4025730"/>
+            <a:ext cx="1393572" cy="1847850"/>
+          </a:xfrm>
+          <a:prstGeom prst="rect">
+            <a:avLst/>
+          </a:prstGeom>
+        </p:spPr>
+      </p:pic>
     </p:spTree>
     <p:extLst>
       <p:ext uri="{BB962C8B-B14F-4D97-AF65-F5344CB8AC3E}">

</xml_diff>